<commit_message>
add more VnV details
</commit_message>
<xml_diff>
--- a/docs/Presentation/VnV.pptx
+++ b/docs/Presentation/VnV.pptx
@@ -272,7 +272,7 @@
           <a:p>
             <a:fld id="{E996DF86-C467-4A92-964E-0EB737BA98EF}" type="datetimeFigureOut">
               <a:rPr lang="en-US" smtClean="0"/>
-              <a:t>2/12/2025</a:t>
+              <a:t>2/13/2025</a:t>
             </a:fld>
             <a:endParaRPr lang="en-US"/>
           </a:p>
@@ -470,7 +470,7 @@
           <a:p>
             <a:fld id="{E996DF86-C467-4A92-964E-0EB737BA98EF}" type="datetimeFigureOut">
               <a:rPr lang="en-US" smtClean="0"/>
-              <a:t>2/12/2025</a:t>
+              <a:t>2/13/2025</a:t>
             </a:fld>
             <a:endParaRPr lang="en-US"/>
           </a:p>
@@ -678,7 +678,7 @@
           <a:p>
             <a:fld id="{E996DF86-C467-4A92-964E-0EB737BA98EF}" type="datetimeFigureOut">
               <a:rPr lang="en-US" smtClean="0"/>
-              <a:t>2/12/2025</a:t>
+              <a:t>2/13/2025</a:t>
             </a:fld>
             <a:endParaRPr lang="en-US"/>
           </a:p>
@@ -876,7 +876,7 @@
           <a:p>
             <a:fld id="{E996DF86-C467-4A92-964E-0EB737BA98EF}" type="datetimeFigureOut">
               <a:rPr lang="en-US" smtClean="0"/>
-              <a:t>2/12/2025</a:t>
+              <a:t>2/13/2025</a:t>
             </a:fld>
             <a:endParaRPr lang="en-US"/>
           </a:p>
@@ -1151,7 +1151,7 @@
           <a:p>
             <a:fld id="{E996DF86-C467-4A92-964E-0EB737BA98EF}" type="datetimeFigureOut">
               <a:rPr lang="en-US" smtClean="0"/>
-              <a:t>2/12/2025</a:t>
+              <a:t>2/13/2025</a:t>
             </a:fld>
             <a:endParaRPr lang="en-US"/>
           </a:p>
@@ -1416,7 +1416,7 @@
           <a:p>
             <a:fld id="{E996DF86-C467-4A92-964E-0EB737BA98EF}" type="datetimeFigureOut">
               <a:rPr lang="en-US" smtClean="0"/>
-              <a:t>2/12/2025</a:t>
+              <a:t>2/13/2025</a:t>
             </a:fld>
             <a:endParaRPr lang="en-US"/>
           </a:p>
@@ -1828,7 +1828,7 @@
           <a:p>
             <a:fld id="{E996DF86-C467-4A92-964E-0EB737BA98EF}" type="datetimeFigureOut">
               <a:rPr lang="en-US" smtClean="0"/>
-              <a:t>2/12/2025</a:t>
+              <a:t>2/13/2025</a:t>
             </a:fld>
             <a:endParaRPr lang="en-US"/>
           </a:p>
@@ -1969,7 +1969,7 @@
           <a:p>
             <a:fld id="{E996DF86-C467-4A92-964E-0EB737BA98EF}" type="datetimeFigureOut">
               <a:rPr lang="en-US" smtClean="0"/>
-              <a:t>2/12/2025</a:t>
+              <a:t>2/13/2025</a:t>
             </a:fld>
             <a:endParaRPr lang="en-US"/>
           </a:p>
@@ -2082,7 +2082,7 @@
           <a:p>
             <a:fld id="{E996DF86-C467-4A92-964E-0EB737BA98EF}" type="datetimeFigureOut">
               <a:rPr lang="en-US" smtClean="0"/>
-              <a:t>2/12/2025</a:t>
+              <a:t>2/13/2025</a:t>
             </a:fld>
             <a:endParaRPr lang="en-US"/>
           </a:p>
@@ -2393,7 +2393,7 @@
           <a:p>
             <a:fld id="{E996DF86-C467-4A92-964E-0EB737BA98EF}" type="datetimeFigureOut">
               <a:rPr lang="en-US" smtClean="0"/>
-              <a:t>2/12/2025</a:t>
+              <a:t>2/13/2025</a:t>
             </a:fld>
             <a:endParaRPr lang="en-US"/>
           </a:p>
@@ -2681,7 +2681,7 @@
           <a:p>
             <a:fld id="{E996DF86-C467-4A92-964E-0EB737BA98EF}" type="datetimeFigureOut">
               <a:rPr lang="en-US" smtClean="0"/>
-              <a:t>2/12/2025</a:t>
+              <a:t>2/13/2025</a:t>
             </a:fld>
             <a:endParaRPr lang="en-US"/>
           </a:p>
@@ -2922,7 +2922,7 @@
           <a:p>
             <a:fld id="{E996DF86-C467-4A92-964E-0EB737BA98EF}" type="datetimeFigureOut">
               <a:rPr lang="en-US" smtClean="0"/>
-              <a:t>2/12/2025</a:t>
+              <a:t>2/13/2025</a:t>
             </a:fld>
             <a:endParaRPr lang="en-US"/>
           </a:p>
@@ -3600,7 +3600,7 @@
           <a:p>
             <a:r>
               <a:rPr lang="en-US" dirty="0"/>
-              <a:t>1/10</a:t>
+              <a:t>9/12</a:t>
             </a:r>
           </a:p>
         </p:txBody>
@@ -4032,7 +4032,7 @@
         <p:spPr>
           <a:xfrm>
             <a:off x="10888869" y="6396382"/>
-            <a:ext cx="633507" cy="369332"/>
+            <a:ext cx="756938" cy="369332"/>
           </a:xfrm>
           <a:prstGeom prst="rect">
             <a:avLst/>
@@ -4047,17 +4047,199 @@
           <a:p>
             <a:r>
               <a:rPr lang="en-US" dirty="0"/>
-              <a:t>1/10</a:t>
-            </a:r>
-          </a:p>
-        </p:txBody>
-      </p:sp>
-      <p:sp>
-        <p:nvSpPr>
-          <p:cNvPr id="3" name="TextBox 2">
-            <a:extLst>
-              <a:ext uri="{FF2B5EF4-FFF2-40B4-BE49-F238E27FC236}">
-                <a16:creationId xmlns:a16="http://schemas.microsoft.com/office/drawing/2014/main" id="{409C2FC9-81F3-8054-B4E4-1F0262CDED32}"/>
+              <a:t>10/12</a:t>
+            </a:r>
+          </a:p>
+        </p:txBody>
+      </p:sp>
+      <mc:AlternateContent xmlns:mc="http://schemas.openxmlformats.org/markup-compatibility/2006" xmlns:a14="http://schemas.microsoft.com/office/drawing/2010/main">
+        <mc:Choice Requires="a14">
+          <p:sp>
+            <p:nvSpPr>
+              <p:cNvPr id="5" name="TextBox 4">
+                <a:extLst>
+                  <a:ext uri="{FF2B5EF4-FFF2-40B4-BE49-F238E27FC236}">
+                    <a16:creationId xmlns:a16="http://schemas.microsoft.com/office/drawing/2014/main" id="{4611967D-3644-CC24-8FE3-15A551B0EC05}"/>
+                  </a:ext>
+                </a:extLst>
+              </p:cNvPr>
+              <p:cNvSpPr txBox="1"/>
+              <p:nvPr/>
+            </p:nvSpPr>
+            <p:spPr>
+              <a:xfrm>
+                <a:off x="349249" y="2211547"/>
+                <a:ext cx="11036300" cy="2246769"/>
+              </a:xfrm>
+              <a:prstGeom prst="rect">
+                <a:avLst/>
+              </a:prstGeom>
+              <a:noFill/>
+            </p:spPr>
+            <p:txBody>
+              <a:bodyPr wrap="square">
+                <a:spAutoFit/>
+              </a:bodyPr>
+              <a:lstStyle/>
+              <a:p>
+                <a:r>
+                  <a:rPr lang="en-US" sz="2800" b="1" dirty="0"/>
+                  <a:t>FR7: use raw data to calculate R-wave position</a:t>
+                </a:r>
+              </a:p>
+              <a:p>
+                <a:r>
+                  <a:rPr lang="en-US" sz="2800" b="1" dirty="0"/>
+                  <a:t>FR8: use annotated data to calculate RMSE</a:t>
+                </a:r>
+              </a:p>
+              <a:p>
+                <a:endParaRPr lang="en-US" sz="2800" b="1" dirty="0"/>
+              </a:p>
+              <a:p>
+                <a:r>
+                  <a:rPr lang="en-US" sz="2800" dirty="0"/>
+                  <a:t>Select testing data from the MIT-BIH database with annotated data.</a:t>
+                </a:r>
+              </a:p>
+              <a:p>
+                <a:r>
+                  <a:rPr lang="en-US" sz="2800" dirty="0"/>
+                  <a:t>A</a:t>
+                </a:r>
+                <a:r>
+                  <a:rPr lang="en-US" altLang="zh-CN" sz="2800" dirty="0"/>
+                  <a:t>ssert </a:t>
+                </a:r>
+                <a:r>
+                  <a:rPr lang="en-US" altLang="zh-CN" sz="2800" dirty="0">
+                    <a:solidFill>
+                      <a:schemeClr val="accent2">
+                        <a:lumMod val="75000"/>
+                      </a:schemeClr>
+                    </a:solidFill>
+                  </a:rPr>
+                  <a:t>0 &lt;= RMSE &lt;= </a:t>
+                </a:r>
+                <a14:m>
+                  <m:oMath xmlns:m="http://schemas.openxmlformats.org/officeDocument/2006/math">
+                    <m:sSub>
+                      <m:sSubPr>
+                        <m:ctrlPr>
+                          <a:rPr lang="en-US" sz="2800" i="1">
+                            <a:solidFill>
+                              <a:schemeClr val="accent2">
+                                <a:lumMod val="75000"/>
+                              </a:schemeClr>
+                            </a:solidFill>
+                            <a:latin typeface="Cambria Math" panose="02040503050406030204" pitchFamily="18" charset="0"/>
+                          </a:rPr>
+                        </m:ctrlPr>
+                      </m:sSubPr>
+                      <m:e>
+                        <m:r>
+                          <a:rPr lang="en-US" sz="2800" i="1" smtClean="0">
+                            <a:solidFill>
+                              <a:schemeClr val="accent2">
+                                <a:lumMod val="75000"/>
+                              </a:schemeClr>
+                            </a:solidFill>
+                            <a:latin typeface="Cambria Math" panose="02040503050406030204" pitchFamily="18" charset="0"/>
+                          </a:rPr>
+                          <m:t>0.1</m:t>
+                        </m:r>
+                        <m:r>
+                          <a:rPr lang="en-US" sz="2800" i="1" smtClean="0">
+                            <a:solidFill>
+                              <a:schemeClr val="accent2">
+                                <a:lumMod val="75000"/>
+                              </a:schemeClr>
+                            </a:solidFill>
+                            <a:latin typeface="Cambria Math" panose="02040503050406030204" pitchFamily="18" charset="0"/>
+                          </a:rPr>
+                          <m:t>𝑓</m:t>
+                        </m:r>
+                      </m:e>
+                      <m:sub>
+                        <m:r>
+                          <a:rPr lang="en-US" sz="2800" i="1">
+                            <a:solidFill>
+                              <a:schemeClr val="accent2">
+                                <a:lumMod val="75000"/>
+                              </a:schemeClr>
+                            </a:solidFill>
+                            <a:latin typeface="Cambria Math" panose="02040503050406030204" pitchFamily="18" charset="0"/>
+                          </a:rPr>
+                          <m:t>𝑐</m:t>
+                        </m:r>
+                      </m:sub>
+                    </m:sSub>
+                    <m:r>
+                      <a:rPr lang="en-US" sz="2800" i="1">
+                        <a:latin typeface="Cambria Math" panose="02040503050406030204" pitchFamily="18" charset="0"/>
+                      </a:rPr>
+                      <m:t> </m:t>
+                    </m:r>
+                  </m:oMath>
+                </a14:m>
+                <a:endParaRPr lang="en-US" sz="2800" i="1" dirty="0">
+                  <a:latin typeface="Cambria Math" panose="02040503050406030204" pitchFamily="18" charset="0"/>
+                </a:endParaRPr>
+              </a:p>
+            </p:txBody>
+          </p:sp>
+        </mc:Choice>
+        <mc:Fallback xmlns="">
+          <p:sp>
+            <p:nvSpPr>
+              <p:cNvPr id="5" name="TextBox 4">
+                <a:extLst>
+                  <a:ext uri="{FF2B5EF4-FFF2-40B4-BE49-F238E27FC236}">
+                    <a16:creationId xmlns:a16="http://schemas.microsoft.com/office/drawing/2014/main" id="{4611967D-3644-CC24-8FE3-15A551B0EC05}"/>
+                  </a:ext>
+                </a:extLst>
+              </p:cNvPr>
+              <p:cNvSpPr txBox="1">
+                <a:spLocks noRot="1" noChangeAspect="1" noMove="1" noResize="1" noEditPoints="1" noAdjustHandles="1" noChangeArrowheads="1" noChangeShapeType="1" noTextEdit="1"/>
+              </p:cNvSpPr>
+              <p:nvPr/>
+            </p:nvSpPr>
+            <p:spPr>
+              <a:xfrm>
+                <a:off x="349249" y="2211547"/>
+                <a:ext cx="11036300" cy="2246769"/>
+              </a:xfrm>
+              <a:prstGeom prst="rect">
+                <a:avLst/>
+              </a:prstGeom>
+              <a:blipFill>
+                <a:blip r:embed="rId2"/>
+                <a:stretch>
+                  <a:fillRect l="-1104" t="-2989" b="-6793"/>
+                </a:stretch>
+              </a:blipFill>
+            </p:spPr>
+            <p:txBody>
+              <a:bodyPr/>
+              <a:lstStyle/>
+              <a:p>
+                <a:r>
+                  <a:rPr lang="en-US">
+                    <a:noFill/>
+                  </a:rPr>
+                  <a:t> </a:t>
+                </a:r>
+              </a:p>
+            </p:txBody>
+          </p:sp>
+        </mc:Fallback>
+      </mc:AlternateContent>
+      <p:sp>
+        <p:nvSpPr>
+          <p:cNvPr id="6" name="TextBox 5">
+            <a:extLst>
+              <a:ext uri="{FF2B5EF4-FFF2-40B4-BE49-F238E27FC236}">
+                <a16:creationId xmlns:a16="http://schemas.microsoft.com/office/drawing/2014/main" id="{B6569945-73ED-B424-DD59-852A93A036D8}"/>
               </a:ext>
             </a:extLst>
           </p:cNvPr>
@@ -4066,8 +4248,8 @@
         </p:nvSpPr>
         <p:spPr>
           <a:xfrm>
-            <a:off x="349249" y="2257267"/>
-            <a:ext cx="11036300" cy="954107"/>
+            <a:off x="349249" y="1431539"/>
+            <a:ext cx="11036300" cy="523220"/>
           </a:xfrm>
           <a:prstGeom prst="rect">
             <a:avLst/>
@@ -4081,90 +4263,8 @@
           <a:lstStyle/>
           <a:p>
             <a:r>
-              <a:rPr lang="en-US" sz="2800" b="1" dirty="0"/>
-              <a:t>FR7: use raw data to calculate R-wave position</a:t>
-            </a:r>
-          </a:p>
-          <a:p>
-            <a:r>
               <a:rPr lang="en-US" sz="2800" dirty="0"/>
-              <a:t>Test</a:t>
-            </a:r>
-          </a:p>
-        </p:txBody>
-      </p:sp>
-      <p:sp>
-        <p:nvSpPr>
-          <p:cNvPr id="5" name="TextBox 4">
-            <a:extLst>
-              <a:ext uri="{FF2B5EF4-FFF2-40B4-BE49-F238E27FC236}">
-                <a16:creationId xmlns:a16="http://schemas.microsoft.com/office/drawing/2014/main" id="{4611967D-3644-CC24-8FE3-15A551B0EC05}"/>
-              </a:ext>
-            </a:extLst>
-          </p:cNvPr>
-          <p:cNvSpPr txBox="1"/>
-          <p:nvPr/>
-        </p:nvSpPr>
-        <p:spPr>
-          <a:xfrm>
-            <a:off x="349249" y="4485355"/>
-            <a:ext cx="11036300" cy="954107"/>
-          </a:xfrm>
-          <a:prstGeom prst="rect">
-            <a:avLst/>
-          </a:prstGeom>
-          <a:noFill/>
-        </p:spPr>
-        <p:txBody>
-          <a:bodyPr wrap="square">
-            <a:spAutoFit/>
-          </a:bodyPr>
-          <a:lstStyle/>
-          <a:p>
-            <a:r>
-              <a:rPr lang="en-US" sz="2800" b="1" dirty="0"/>
-              <a:t>FR8: use annotated data to calculate RMSE</a:t>
-            </a:r>
-          </a:p>
-          <a:p>
-            <a:r>
-              <a:rPr lang="en-US" sz="2800" dirty="0"/>
-              <a:t>Test</a:t>
-            </a:r>
-          </a:p>
-        </p:txBody>
-      </p:sp>
-      <p:sp>
-        <p:nvSpPr>
-          <p:cNvPr id="6" name="TextBox 5">
-            <a:extLst>
-              <a:ext uri="{FF2B5EF4-FFF2-40B4-BE49-F238E27FC236}">
-                <a16:creationId xmlns:a16="http://schemas.microsoft.com/office/drawing/2014/main" id="{B6569945-73ED-B424-DD59-852A93A036D8}"/>
-              </a:ext>
-            </a:extLst>
-          </p:cNvPr>
-          <p:cNvSpPr txBox="1"/>
-          <p:nvPr/>
-        </p:nvSpPr>
-        <p:spPr>
-          <a:xfrm>
-            <a:off x="349249" y="1431539"/>
-            <a:ext cx="11036300" cy="523220"/>
-          </a:xfrm>
-          <a:prstGeom prst="rect">
-            <a:avLst/>
-          </a:prstGeom>
-          <a:noFill/>
-        </p:spPr>
-        <p:txBody>
-          <a:bodyPr wrap="square">
-            <a:spAutoFit/>
-          </a:bodyPr>
-          <a:lstStyle/>
-          <a:p>
-            <a:r>
-              <a:rPr lang="en-US" sz="2800" dirty="0"/>
-              <a:t>FRs combine FR1 to FR6</a:t>
+              <a:t>FRs combine FR1 to FR6, use the same test case</a:t>
             </a:r>
           </a:p>
         </p:txBody>
@@ -4291,7 +4391,7 @@
         <p:spPr>
           <a:xfrm>
             <a:off x="10888869" y="6396382"/>
-            <a:ext cx="633507" cy="369332"/>
+            <a:ext cx="756938" cy="369332"/>
           </a:xfrm>
           <a:prstGeom prst="rect">
             <a:avLst/>
@@ -4306,7 +4406,7 @@
           <a:p>
             <a:r>
               <a:rPr lang="en-US" dirty="0"/>
-              <a:t>1/10</a:t>
+              <a:t>11/12</a:t>
             </a:r>
           </a:p>
         </p:txBody>
@@ -4521,7 +4621,7 @@
         <p:spPr>
           <a:xfrm>
             <a:off x="10888869" y="6396382"/>
-            <a:ext cx="633507" cy="369332"/>
+            <a:ext cx="756938" cy="369332"/>
           </a:xfrm>
           <a:prstGeom prst="rect">
             <a:avLst/>
@@ -4536,7 +4636,7 @@
           <a:p>
             <a:r>
               <a:rPr lang="en-US" dirty="0"/>
-              <a:t>1/10</a:t>
+              <a:t>12/12</a:t>
             </a:r>
           </a:p>
         </p:txBody>
@@ -4745,7 +4845,7 @@
           <a:p>
             <a:r>
               <a:rPr lang="en-US" dirty="0"/>
-              <a:t>1/10</a:t>
+              <a:t>1/12</a:t>
             </a:r>
           </a:p>
         </p:txBody>
@@ -5065,7 +5165,7 @@
           <a:p>
             <a:r>
               <a:rPr lang="en-US" dirty="0"/>
-              <a:t>1/10</a:t>
+              <a:t>2/12</a:t>
             </a:r>
           </a:p>
         </p:txBody>
@@ -5333,7 +5433,7 @@
           <a:p>
             <a:r>
               <a:rPr lang="en-US" dirty="0"/>
-              <a:t>1/10</a:t>
+              <a:t>3/12</a:t>
             </a:r>
           </a:p>
         </p:txBody>
@@ -5587,7 +5687,77 @@
           <a:p>
             <a:r>
               <a:rPr lang="en-US" dirty="0"/>
-              <a:t>1/10</a:t>
+              <a:t>4/12</a:t>
+            </a:r>
+          </a:p>
+        </p:txBody>
+      </p:sp>
+      <p:sp>
+        <p:nvSpPr>
+          <p:cNvPr id="2" name="TextBox 1">
+            <a:extLst>
+              <a:ext uri="{FF2B5EF4-FFF2-40B4-BE49-F238E27FC236}">
+                <a16:creationId xmlns:a16="http://schemas.microsoft.com/office/drawing/2014/main" id="{7CB3516F-CFE0-4814-9953-B8D45A1B9034}"/>
+              </a:ext>
+            </a:extLst>
+          </p:cNvPr>
+          <p:cNvSpPr txBox="1"/>
+          <p:nvPr/>
+        </p:nvSpPr>
+        <p:spPr>
+          <a:xfrm>
+            <a:off x="444498" y="1361108"/>
+            <a:ext cx="10837583" cy="2677656"/>
+          </a:xfrm>
+          <a:prstGeom prst="rect">
+            <a:avLst/>
+          </a:prstGeom>
+          <a:noFill/>
+        </p:spPr>
+        <p:txBody>
+          <a:bodyPr wrap="square">
+            <a:spAutoFit/>
+          </a:bodyPr>
+          <a:lstStyle/>
+          <a:p>
+            <a:r>
+              <a:rPr lang="en-US" sz="2800" dirty="0"/>
+              <a:t>Checklist:</a:t>
+            </a:r>
+          </a:p>
+          <a:p>
+            <a:pPr marL="457200" indent="-457200">
+              <a:buFontTx/>
+              <a:buChar char="-"/>
+            </a:pPr>
+            <a:r>
+              <a:rPr lang="en-US" sz="2800" b="1" dirty="0"/>
+              <a:t>Low module coupling</a:t>
+            </a:r>
+            <a:r>
+              <a:rPr lang="en-US" sz="2800" dirty="0"/>
+              <a:t>: modules can be reused anywhere and do not affect others.</a:t>
+            </a:r>
+          </a:p>
+          <a:p>
+            <a:pPr marL="457200" indent="-457200">
+              <a:buFontTx/>
+              <a:buChar char="-"/>
+            </a:pPr>
+            <a:endParaRPr lang="en-US" sz="2800" dirty="0"/>
+          </a:p>
+          <a:p>
+            <a:pPr marL="457200" indent="-457200">
+              <a:buFontTx/>
+              <a:buChar char="-"/>
+            </a:pPr>
+            <a:r>
+              <a:rPr lang="en-US" sz="2800" b="1" dirty="0"/>
+              <a:t>Good Hierarchy</a:t>
+            </a:r>
+            <a:r>
+              <a:rPr lang="en-US" sz="2800" dirty="0"/>
+              <a:t>: make sure the hierarchy is clear and easy to maintain.</a:t>
             </a:r>
           </a:p>
         </p:txBody>
@@ -5729,7 +5899,143 @@
           <a:p>
             <a:r>
               <a:rPr lang="en-US" dirty="0"/>
-              <a:t>1/10</a:t>
+              <a:t>5/12</a:t>
+            </a:r>
+          </a:p>
+        </p:txBody>
+      </p:sp>
+      <p:sp>
+        <p:nvSpPr>
+          <p:cNvPr id="2" name="TextBox 1">
+            <a:extLst>
+              <a:ext uri="{FF2B5EF4-FFF2-40B4-BE49-F238E27FC236}">
+                <a16:creationId xmlns:a16="http://schemas.microsoft.com/office/drawing/2014/main" id="{2C69159C-8E8B-EE18-EDC8-13A07801250C}"/>
+              </a:ext>
+            </a:extLst>
+          </p:cNvPr>
+          <p:cNvSpPr txBox="1"/>
+          <p:nvPr/>
+        </p:nvSpPr>
+        <p:spPr>
+          <a:xfrm>
+            <a:off x="444498" y="1361108"/>
+            <a:ext cx="10837583" cy="4401205"/>
+          </a:xfrm>
+          <a:prstGeom prst="rect">
+            <a:avLst/>
+          </a:prstGeom>
+          <a:noFill/>
+        </p:spPr>
+        <p:txBody>
+          <a:bodyPr wrap="square">
+            <a:spAutoFit/>
+          </a:bodyPr>
+          <a:lstStyle/>
+          <a:p>
+            <a:r>
+              <a:rPr lang="en-US" sz="2800" dirty="0"/>
+              <a:t>Checklist:</a:t>
+            </a:r>
+          </a:p>
+          <a:p>
+            <a:pPr marL="457200" indent="-457200">
+              <a:buFontTx/>
+              <a:buChar char="-"/>
+            </a:pPr>
+            <a:r>
+              <a:rPr lang="en-US" sz="2800" b="1" dirty="0"/>
+              <a:t>Completeness </a:t>
+            </a:r>
+            <a:r>
+              <a:rPr lang="en-US" sz="2800" dirty="0"/>
+              <a:t>: </a:t>
+            </a:r>
+            <a:r>
+              <a:rPr lang="en-US" sz="2800" dirty="0" err="1"/>
+              <a:t>VnV</a:t>
+            </a:r>
+            <a:r>
+              <a:rPr lang="en-US" sz="2800" dirty="0"/>
+              <a:t> plan includes all necessary sections.</a:t>
+            </a:r>
+          </a:p>
+          <a:p>
+            <a:pPr marL="457200" indent="-457200">
+              <a:buFontTx/>
+              <a:buChar char="-"/>
+            </a:pPr>
+            <a:endParaRPr lang="en-US" sz="2800" dirty="0"/>
+          </a:p>
+          <a:p>
+            <a:pPr marL="457200" indent="-457200">
+              <a:buFontTx/>
+              <a:buChar char="-"/>
+            </a:pPr>
+            <a:r>
+              <a:rPr lang="en-US" sz="2800" b="1" dirty="0"/>
+              <a:t>Formatting</a:t>
+            </a:r>
+            <a:r>
+              <a:rPr lang="en-US" sz="2800" dirty="0"/>
+              <a:t>: The document has a clear, logical structure, and properly organized.</a:t>
+            </a:r>
+          </a:p>
+          <a:p>
+            <a:pPr marL="457200" indent="-457200">
+              <a:buFontTx/>
+              <a:buChar char="-"/>
+            </a:pPr>
+            <a:endParaRPr lang="en-US" sz="2800" dirty="0"/>
+          </a:p>
+          <a:p>
+            <a:pPr marL="457200" indent="-457200">
+              <a:buFontTx/>
+              <a:buChar char="-"/>
+            </a:pPr>
+            <a:r>
+              <a:rPr lang="en-US" sz="2800" b="1" dirty="0"/>
+              <a:t>Appropriateness: </a:t>
+            </a:r>
+            <a:r>
+              <a:rPr lang="en-US" sz="2800" dirty="0"/>
+              <a:t>Confirm that the methods and tools proposed in the </a:t>
+            </a:r>
+            <a:r>
+              <a:rPr lang="en-US" sz="2800" dirty="0" err="1"/>
+              <a:t>VnV</a:t>
+            </a:r>
+            <a:r>
+              <a:rPr lang="en-US" sz="2800" dirty="0"/>
+              <a:t> plan are appropriate for the project.</a:t>
+            </a:r>
+          </a:p>
+          <a:p>
+            <a:pPr marL="457200" indent="-457200">
+              <a:buFontTx/>
+              <a:buChar char="-"/>
+            </a:pPr>
+            <a:endParaRPr lang="en-US" sz="2800" dirty="0"/>
+          </a:p>
+          <a:p>
+            <a:pPr marL="457200" indent="-457200">
+              <a:buFontTx/>
+              <a:buChar char="-"/>
+            </a:pPr>
+            <a:r>
+              <a:rPr lang="en-US" sz="2800" b="1" dirty="0"/>
+              <a:t>Coverage: </a:t>
+            </a:r>
+            <a:r>
+              <a:rPr lang="en-US" sz="2800" dirty="0"/>
+              <a:t>Make sure the </a:t>
+            </a:r>
+            <a:r>
+              <a:rPr lang="en-US" sz="2800" dirty="0" err="1"/>
+              <a:t>VnV</a:t>
+            </a:r>
+            <a:r>
+              <a:rPr lang="en-US" sz="2800" dirty="0"/>
+              <a:t> plan covers all the requirements.</a:t>
             </a:r>
           </a:p>
         </p:txBody>
@@ -5871,8 +6177,105 @@
           <a:p>
             <a:r>
               <a:rPr lang="en-US" dirty="0"/>
-              <a:t>1/10</a:t>
-            </a:r>
+              <a:t>6/12</a:t>
+            </a:r>
+          </a:p>
+        </p:txBody>
+      </p:sp>
+      <p:sp>
+        <p:nvSpPr>
+          <p:cNvPr id="2" name="TextBox 1">
+            <a:extLst>
+              <a:ext uri="{FF2B5EF4-FFF2-40B4-BE49-F238E27FC236}">
+                <a16:creationId xmlns:a16="http://schemas.microsoft.com/office/drawing/2014/main" id="{42DBE6DC-1405-11AF-CECD-BA2057A1F848}"/>
+              </a:ext>
+            </a:extLst>
+          </p:cNvPr>
+          <p:cNvSpPr txBox="1"/>
+          <p:nvPr/>
+        </p:nvSpPr>
+        <p:spPr>
+          <a:xfrm>
+            <a:off x="444498" y="1361108"/>
+            <a:ext cx="10837583" cy="3539430"/>
+          </a:xfrm>
+          <a:prstGeom prst="rect">
+            <a:avLst/>
+          </a:prstGeom>
+          <a:noFill/>
+        </p:spPr>
+        <p:txBody>
+          <a:bodyPr wrap="square">
+            <a:spAutoFit/>
+          </a:bodyPr>
+          <a:lstStyle/>
+          <a:p>
+            <a:r>
+              <a:rPr lang="en-US" sz="2800" dirty="0"/>
+              <a:t>Checklist:</a:t>
+            </a:r>
+          </a:p>
+          <a:p>
+            <a:pPr marL="457200" indent="-457200">
+              <a:buFontTx/>
+              <a:buChar char="-"/>
+            </a:pPr>
+            <a:r>
+              <a:rPr lang="en-US" sz="2800" b="1" dirty="0"/>
+              <a:t>Static code check</a:t>
+            </a:r>
+          </a:p>
+          <a:p>
+            <a:pPr marL="457200" indent="-457200">
+              <a:buFontTx/>
+              <a:buChar char="-"/>
+            </a:pPr>
+            <a:endParaRPr lang="en-US" sz="2800" dirty="0"/>
+          </a:p>
+          <a:p>
+            <a:pPr marL="457200" indent="-457200">
+              <a:buFontTx/>
+              <a:buChar char="-"/>
+            </a:pPr>
+            <a:r>
+              <a:rPr lang="en-US" sz="2800" b="1" dirty="0"/>
+              <a:t>Code coverage test</a:t>
+            </a:r>
+          </a:p>
+          <a:p>
+            <a:pPr marL="457200" indent="-457200">
+              <a:buFontTx/>
+              <a:buChar char="-"/>
+            </a:pPr>
+            <a:endParaRPr lang="en-US" sz="2800" b="1" dirty="0"/>
+          </a:p>
+          <a:p>
+            <a:pPr marL="457200" indent="-457200">
+              <a:buFontTx/>
+              <a:buChar char="-"/>
+            </a:pPr>
+            <a:r>
+              <a:rPr lang="en-US" sz="2800" b="1" dirty="0"/>
+              <a:t>Unit test</a:t>
+            </a:r>
+          </a:p>
+          <a:p>
+            <a:pPr marL="457200" indent="-457200">
+              <a:buFontTx/>
+              <a:buChar char="-"/>
+            </a:pPr>
+            <a:endParaRPr lang="en-US" sz="2800" b="1" dirty="0"/>
+          </a:p>
+          <a:p>
+            <a:pPr marL="457200" indent="-457200">
+              <a:buFontTx/>
+              <a:buChar char="-"/>
+            </a:pPr>
+            <a:r>
+              <a:rPr lang="en-US" sz="2800" b="1" dirty="0"/>
+              <a:t>Code review</a:t>
+            </a:r>
+            <a:endParaRPr lang="en-US" sz="2800" dirty="0"/>
           </a:p>
         </p:txBody>
       </p:sp>
@@ -6013,7 +6416,7 @@
           <a:p>
             <a:r>
               <a:rPr lang="en-US" dirty="0"/>
-              <a:t>1/10</a:t>
+              <a:t>7/12</a:t>
             </a:r>
           </a:p>
         </p:txBody>
@@ -6341,7 +6744,7 @@
           <a:p>
             <a:r>
               <a:rPr lang="en-US" dirty="0"/>
-              <a:t>1/10</a:t>
+              <a:t>8/12</a:t>
             </a:r>
           </a:p>
         </p:txBody>
@@ -6450,8 +6853,8 @@
           </a:p>
         </p:txBody>
       </p:sp>
-      <mc:AlternateContent xmlns:mc="http://schemas.openxmlformats.org/markup-compatibility/2006">
-        <mc:Choice xmlns:a14="http://schemas.microsoft.com/office/drawing/2010/main" Requires="a14">
+      <mc:AlternateContent xmlns:mc="http://schemas.openxmlformats.org/markup-compatibility/2006" xmlns:a14="http://schemas.microsoft.com/office/drawing/2010/main">
+        <mc:Choice Requires="a14">
           <p:sp>
             <p:nvSpPr>
               <p:cNvPr id="7" name="TextBox 6">
@@ -6553,7 +6956,7 @@
             </p:txBody>
           </p:sp>
         </mc:Choice>
-        <mc:Fallback>
+        <mc:Fallback xmlns="">
           <p:sp>
             <p:nvSpPr>
               <p:cNvPr id="7" name="TextBox 6">

</xml_diff>

<commit_message>
add VnV unit test
</commit_message>
<xml_diff>
--- a/docs/Presentation/VnV.pptx
+++ b/docs/Presentation/VnV.pptx
@@ -4638,6 +4638,104 @@
               <a:rPr lang="en-US" dirty="0"/>
               <a:t>12/12</a:t>
             </a:r>
+          </a:p>
+        </p:txBody>
+      </p:sp>
+      <p:sp>
+        <p:nvSpPr>
+          <p:cNvPr id="2" name="TextBox 1">
+            <a:extLst>
+              <a:ext uri="{FF2B5EF4-FFF2-40B4-BE49-F238E27FC236}">
+                <a16:creationId xmlns:a16="http://schemas.microsoft.com/office/drawing/2014/main" id="{F6E2FBBC-B6D9-6C47-417B-6017F64CF406}"/>
+              </a:ext>
+            </a:extLst>
+          </p:cNvPr>
+          <p:cNvSpPr txBox="1"/>
+          <p:nvPr/>
+        </p:nvSpPr>
+        <p:spPr>
+          <a:xfrm>
+            <a:off x="349249" y="1521716"/>
+            <a:ext cx="11036300" cy="3539430"/>
+          </a:xfrm>
+          <a:prstGeom prst="rect">
+            <a:avLst/>
+          </a:prstGeom>
+          <a:noFill/>
+        </p:spPr>
+        <p:txBody>
+          <a:bodyPr wrap="square">
+            <a:spAutoFit/>
+          </a:bodyPr>
+          <a:lstStyle/>
+          <a:p>
+            <a:r>
+              <a:rPr lang="en-US" sz="2800" b="1" dirty="0"/>
+              <a:t>Units:</a:t>
+            </a:r>
+          </a:p>
+          <a:p>
+            <a:pPr marL="457200" indent="-457200">
+              <a:buFontTx/>
+              <a:buChar char="-"/>
+            </a:pPr>
+            <a:r>
+              <a:rPr lang="en-US" sz="2800" b="1" dirty="0"/>
+              <a:t>Data loader</a:t>
+            </a:r>
+          </a:p>
+          <a:p>
+            <a:pPr marL="457200" indent="-457200">
+              <a:buFontTx/>
+              <a:buChar char="-"/>
+            </a:pPr>
+            <a:r>
+              <a:rPr lang="en-US" sz="2800" b="1" dirty="0"/>
+              <a:t>Input preprocessing</a:t>
+            </a:r>
+          </a:p>
+          <a:p>
+            <a:pPr marL="457200" indent="-457200">
+              <a:buFontTx/>
+              <a:buChar char="-"/>
+            </a:pPr>
+            <a:r>
+              <a:rPr lang="en-US" sz="2800" b="1" dirty="0"/>
+              <a:t>Filter</a:t>
+            </a:r>
+          </a:p>
+          <a:p>
+            <a:pPr marL="457200" indent="-457200">
+              <a:buFontTx/>
+              <a:buChar char="-"/>
+            </a:pPr>
+            <a:r>
+              <a:rPr lang="en-US" sz="2800" b="1" dirty="0"/>
+              <a:t>Mathematical function</a:t>
+            </a:r>
+          </a:p>
+          <a:p>
+            <a:pPr marL="457200" indent="-457200">
+              <a:buFontTx/>
+              <a:buChar char="-"/>
+            </a:pPr>
+            <a:r>
+              <a:rPr lang="en-US" sz="2800" b="1" dirty="0"/>
+              <a:t>Post processing</a:t>
+            </a:r>
+          </a:p>
+          <a:p>
+            <a:pPr marL="457200" indent="-457200">
+              <a:buFontTx/>
+              <a:buChar char="-"/>
+            </a:pPr>
+            <a:r>
+              <a:rPr lang="en-US" sz="2800" b="1" dirty="0"/>
+              <a:t>Module interfaces</a:t>
+            </a:r>
+          </a:p>
+          <a:p>
+            <a:endParaRPr lang="en-US" sz="2800" dirty="0"/>
           </a:p>
         </p:txBody>
       </p:sp>

</xml_diff>